<commit_message>
Finsl Version of DPS2018 Demo files
</commit_message>
<xml_diff>
--- a/DPS 2018/DbaTools/dbatools_v1.pptx
+++ b/DPS 2018/DbaTools/dbatools_v1.pptx
@@ -222,7 +222,7 @@
           <a:p>
             <a:fld id="{232F600C-6C1A-4181-A4D8-B1126BB5DB1F}" type="datetimeFigureOut">
               <a:rPr lang="en-AU" smtClean="0"/>
-              <a:t>6/08/2018</a:t>
+              <a:t>12/08/2018</a:t>
             </a:fld>
             <a:endParaRPr lang="en-AU"/>
           </a:p>
@@ -7887,7 +7887,7 @@
           </a:ln>
           <a:extLst>
             <a:ext uri="{C572A759-6A51-4108-AA02-DFA0A04FC94B}">
-              <ma14:wrappingTextBoxFlag xmlns="" xmlns:ma14="http://schemas.microsoft.com/office/mac/drawingml/2011/main" xmlns:lc="http://schemas.openxmlformats.org/drawingml/2006/lockedCanvas" val="1"/>
+              <ma14:wrappingTextBoxFlag xmlns:lc="http://schemas.openxmlformats.org/drawingml/2006/lockedCanvas" xmlns:ma14="http://schemas.microsoft.com/office/mac/drawingml/2011/main" xmlns="" val="1"/>
             </a:ext>
           </a:extLst>
         </p:spPr>
@@ -8964,14 +8964,14 @@
           </a:ln>
           <a:extLst>
             <a:ext uri="{909E8E84-426E-40dd-AFC4-6F175D3DCCD1}">
-              <a14:hiddenFill xmlns:a14="http://schemas.microsoft.com/office/drawing/2010/main" xmlns="">
+              <a14:hiddenFill xmlns="" xmlns:a14="http://schemas.microsoft.com/office/drawing/2010/main">
                 <a:solidFill>
                   <a:srgbClr val="FFFFFF"/>
                 </a:solidFill>
               </a14:hiddenFill>
             </a:ext>
             <a:ext uri="{91240B29-F687-4f45-9708-019B960494DF}">
-              <a14:hiddenLine xmlns:a14="http://schemas.microsoft.com/office/drawing/2010/main" xmlns="" w="9525">
+              <a14:hiddenLine xmlns="" xmlns:a14="http://schemas.microsoft.com/office/drawing/2010/main" w="9525">
                 <a:solidFill>
                   <a:srgbClr val="000000"/>
                 </a:solidFill>
@@ -9011,14 +9011,14 @@
           </a:ln>
           <a:extLst>
             <a:ext uri="{909E8E84-426E-40dd-AFC4-6F175D3DCCD1}">
-              <a14:hiddenFill xmlns:a14="http://schemas.microsoft.com/office/drawing/2010/main" xmlns="">
+              <a14:hiddenFill xmlns="" xmlns:a14="http://schemas.microsoft.com/office/drawing/2010/main">
                 <a:solidFill>
                   <a:srgbClr val="FFFFFF"/>
                 </a:solidFill>
               </a14:hiddenFill>
             </a:ext>
             <a:ext uri="{91240B29-F687-4f45-9708-019B960494DF}">
-              <a14:hiddenLine xmlns:a14="http://schemas.microsoft.com/office/drawing/2010/main" xmlns="" w="9525">
+              <a14:hiddenLine xmlns="" xmlns:a14="http://schemas.microsoft.com/office/drawing/2010/main" w="9525">
                 <a:solidFill>
                   <a:srgbClr val="000000"/>
                 </a:solidFill>
@@ -9086,14 +9086,14 @@
           </a:ln>
           <a:extLst>
             <a:ext uri="{909E8E84-426E-40dd-AFC4-6F175D3DCCD1}">
-              <a14:hiddenFill xmlns:a14="http://schemas.microsoft.com/office/drawing/2010/main" xmlns="">
+              <a14:hiddenFill xmlns="" xmlns:a14="http://schemas.microsoft.com/office/drawing/2010/main">
                 <a:solidFill>
                   <a:srgbClr val="FFFFFF"/>
                 </a:solidFill>
               </a14:hiddenFill>
             </a:ext>
             <a:ext uri="{91240B29-F687-4f45-9708-019B960494DF}">
-              <a14:hiddenLine xmlns:a14="http://schemas.microsoft.com/office/drawing/2010/main" xmlns="" w="9525">
+              <a14:hiddenLine xmlns="" xmlns:a14="http://schemas.microsoft.com/office/drawing/2010/main" w="9525">
                 <a:solidFill>
                   <a:srgbClr val="000000"/>
                 </a:solidFill>
@@ -9169,14 +9169,14 @@
           </a:ln>
           <a:extLst>
             <a:ext uri="{909E8E84-426E-40dd-AFC4-6F175D3DCCD1}">
-              <a14:hiddenFill xmlns:a14="http://schemas.microsoft.com/office/drawing/2010/main" xmlns="">
+              <a14:hiddenFill xmlns="" xmlns:a14="http://schemas.microsoft.com/office/drawing/2010/main">
                 <a:solidFill>
                   <a:srgbClr val="FFFFFF"/>
                 </a:solidFill>
               </a14:hiddenFill>
             </a:ext>
             <a:ext uri="{91240B29-F687-4f45-9708-019B960494DF}">
-              <a14:hiddenLine xmlns:a14="http://schemas.microsoft.com/office/drawing/2010/main" xmlns="" w="9525">
+              <a14:hiddenLine xmlns="" xmlns:a14="http://schemas.microsoft.com/office/drawing/2010/main" w="9525">
                 <a:solidFill>
                   <a:srgbClr val="000000"/>
                 </a:solidFill>
@@ -9252,14 +9252,14 @@
           </a:ln>
           <a:extLst>
             <a:ext uri="{909E8E84-426E-40dd-AFC4-6F175D3DCCD1}">
-              <a14:hiddenFill xmlns:a14="http://schemas.microsoft.com/office/drawing/2010/main" xmlns="">
+              <a14:hiddenFill xmlns="" xmlns:a14="http://schemas.microsoft.com/office/drawing/2010/main">
                 <a:solidFill>
                   <a:srgbClr val="FFFFFF"/>
                 </a:solidFill>
               </a14:hiddenFill>
             </a:ext>
             <a:ext uri="{91240B29-F687-4f45-9708-019B960494DF}">
-              <a14:hiddenLine xmlns:a14="http://schemas.microsoft.com/office/drawing/2010/main" xmlns="" w="9525">
+              <a14:hiddenLine xmlns="" xmlns:a14="http://schemas.microsoft.com/office/drawing/2010/main" w="9525">
                 <a:solidFill>
                   <a:srgbClr val="000000"/>
                 </a:solidFill>
@@ -9286,7 +9286,7 @@
             </a:pPr>
             <a:r>
               <a:rPr lang="en-GB" sz="1692" dirty="0"/>
-              <a:t>sqlsaturday@sqllensman.com</a:t>
+              <a:t>dps2018@sqllensman.com</a:t>
             </a:r>
           </a:p>
         </p:txBody>
@@ -9372,7 +9372,7 @@
         <p:spPr>
           <a:xfrm>
             <a:off x="7139616" y="2636912"/>
-            <a:ext cx="3279831" cy="923330"/>
+            <a:ext cx="4857071" cy="2862322"/>
           </a:xfrm>
           <a:prstGeom prst="rect">
             <a:avLst/>
@@ -9400,6 +9400,33 @@
               <a:rPr lang="en-AU" dirty="0"/>
               <a:t>Production DBA for 10+ years.</a:t>
             </a:r>
+          </a:p>
+          <a:p>
+            <a:endParaRPr lang="en-AU" dirty="0"/>
+          </a:p>
+          <a:p>
+            <a:r>
+              <a:rPr lang="en-AU" dirty="0"/>
+              <a:t>Regular Speaker at SQL Saturday and other community events in Asia Pacific region</a:t>
+            </a:r>
+          </a:p>
+          <a:p>
+            <a:endParaRPr lang="en-AU" dirty="0"/>
+          </a:p>
+          <a:p>
+            <a:r>
+              <a:rPr lang="en-AU" dirty="0"/>
+              <a:t>All Presentations available at:</a:t>
+            </a:r>
+          </a:p>
+          <a:p>
+            <a:r>
+              <a:rPr lang="en-AU" dirty="0"/>
+              <a:t>https://github.com/sqllensman/Presentations</a:t>
+            </a:r>
+          </a:p>
+          <a:p>
+            <a:endParaRPr lang="en-AU" dirty="0"/>
           </a:p>
         </p:txBody>
       </p:sp>
@@ -9801,7 +9828,7 @@
           </a:ln>
           <a:extLst>
             <a:ext uri="{C572A759-6A51-4108-AA02-DFA0A04FC94B}">
-              <ma14:wrappingTextBoxFlag xmlns="" xmlns:ma14="http://schemas.microsoft.com/office/mac/drawingml/2011/main" val="1"/>
+              <ma14:wrappingTextBoxFlag xmlns:ma14="http://schemas.microsoft.com/office/mac/drawingml/2011/main" xmlns="" val="1"/>
             </a:ext>
           </a:extLst>
         </p:spPr>

</xml_diff>